<commit_message>
Workbook mostly completed, with final tidy up required only, and conversion to .pdf
</commit_message>
<xml_diff>
--- a/workbook_T1A1/General Flowchart.pptx
+++ b/workbook_T1A1/General Flowchart.pptx
@@ -104,6 +104,11 @@
       </a:defRPr>
     </a:lvl9pPr>
   </p:defaultTextStyle>
+  <p:extLst>
+    <p:ext uri="{EFAFB233-063F-42B5-8137-9DF3F51BA10A}">
+      <p15:sldGuideLst xmlns:p15="http://schemas.microsoft.com/office/powerpoint/2012/main"/>
+    </p:ext>
+  </p:extLst>
 </p:presentation>
 </file>
 
@@ -256,7 +261,7 @@
           <a:p>
             <a:fld id="{EA184180-7B58-AA43-9BE4-CD02A0E0F7E3}" type="datetimeFigureOut">
               <a:rPr lang="en-US" smtClean="0"/>
-              <a:t>9/14/21</a:t>
+              <a:t>9/19/21</a:t>
             </a:fld>
             <a:endParaRPr lang="en-US"/>
           </a:p>
@@ -456,7 +461,7 @@
           <a:p>
             <a:fld id="{EA184180-7B58-AA43-9BE4-CD02A0E0F7E3}" type="datetimeFigureOut">
               <a:rPr lang="en-US" smtClean="0"/>
-              <a:t>9/14/21</a:t>
+              <a:t>9/19/21</a:t>
             </a:fld>
             <a:endParaRPr lang="en-US"/>
           </a:p>
@@ -666,7 +671,7 @@
           <a:p>
             <a:fld id="{EA184180-7B58-AA43-9BE4-CD02A0E0F7E3}" type="datetimeFigureOut">
               <a:rPr lang="en-US" smtClean="0"/>
-              <a:t>9/14/21</a:t>
+              <a:t>9/19/21</a:t>
             </a:fld>
             <a:endParaRPr lang="en-US"/>
           </a:p>
@@ -866,7 +871,7 @@
           <a:p>
             <a:fld id="{EA184180-7B58-AA43-9BE4-CD02A0E0F7E3}" type="datetimeFigureOut">
               <a:rPr lang="en-US" smtClean="0"/>
-              <a:t>9/14/21</a:t>
+              <a:t>9/19/21</a:t>
             </a:fld>
             <a:endParaRPr lang="en-US"/>
           </a:p>
@@ -1142,7 +1147,7 @@
           <a:p>
             <a:fld id="{EA184180-7B58-AA43-9BE4-CD02A0E0F7E3}" type="datetimeFigureOut">
               <a:rPr lang="en-US" smtClean="0"/>
-              <a:t>9/14/21</a:t>
+              <a:t>9/19/21</a:t>
             </a:fld>
             <a:endParaRPr lang="en-US"/>
           </a:p>
@@ -1410,7 +1415,7 @@
           <a:p>
             <a:fld id="{EA184180-7B58-AA43-9BE4-CD02A0E0F7E3}" type="datetimeFigureOut">
               <a:rPr lang="en-US" smtClean="0"/>
-              <a:t>9/14/21</a:t>
+              <a:t>9/19/21</a:t>
             </a:fld>
             <a:endParaRPr lang="en-US"/>
           </a:p>
@@ -1825,7 +1830,7 @@
           <a:p>
             <a:fld id="{EA184180-7B58-AA43-9BE4-CD02A0E0F7E3}" type="datetimeFigureOut">
               <a:rPr lang="en-US" smtClean="0"/>
-              <a:t>9/14/21</a:t>
+              <a:t>9/19/21</a:t>
             </a:fld>
             <a:endParaRPr lang="en-US"/>
           </a:p>
@@ -1967,7 +1972,7 @@
           <a:p>
             <a:fld id="{EA184180-7B58-AA43-9BE4-CD02A0E0F7E3}" type="datetimeFigureOut">
               <a:rPr lang="en-US" smtClean="0"/>
-              <a:t>9/14/21</a:t>
+              <a:t>9/19/21</a:t>
             </a:fld>
             <a:endParaRPr lang="en-US"/>
           </a:p>
@@ -2080,7 +2085,7 @@
           <a:p>
             <a:fld id="{EA184180-7B58-AA43-9BE4-CD02A0E0F7E3}" type="datetimeFigureOut">
               <a:rPr lang="en-US" smtClean="0"/>
-              <a:t>9/14/21</a:t>
+              <a:t>9/19/21</a:t>
             </a:fld>
             <a:endParaRPr lang="en-US"/>
           </a:p>
@@ -2393,7 +2398,7 @@
           <a:p>
             <a:fld id="{EA184180-7B58-AA43-9BE4-CD02A0E0F7E3}" type="datetimeFigureOut">
               <a:rPr lang="en-US" smtClean="0"/>
-              <a:t>9/14/21</a:t>
+              <a:t>9/19/21</a:t>
             </a:fld>
             <a:endParaRPr lang="en-US"/>
           </a:p>
@@ -2682,7 +2687,7 @@
           <a:p>
             <a:fld id="{EA184180-7B58-AA43-9BE4-CD02A0E0F7E3}" type="datetimeFigureOut">
               <a:rPr lang="en-US" smtClean="0"/>
-              <a:t>9/14/21</a:t>
+              <a:t>9/19/21</a:t>
             </a:fld>
             <a:endParaRPr lang="en-US"/>
           </a:p>
@@ -2925,7 +2930,7 @@
           <a:p>
             <a:fld id="{EA184180-7B58-AA43-9BE4-CD02A0E0F7E3}" type="datetimeFigureOut">
               <a:rPr lang="en-US" smtClean="0"/>
-              <a:t>9/14/21</a:t>
+              <a:t>9/19/21</a:t>
             </a:fld>
             <a:endParaRPr lang="en-US"/>
           </a:p>
@@ -3528,7 +3533,27 @@
                   </a:schemeClr>
                 </a:solidFill>
               </a:rPr>
-              <a:t>Research / Confirm what a prime number is. Reviewing this will ensure that the goal is recognized. It will help to identify the logical components.</a:t>
+              <a:t>Research / Confirm what a prime number is. Reviewing this will ensure that the goal is </a:t>
+            </a:r>
+            <a:r>
+              <a:rPr lang="en-US" sz="1000" dirty="0" err="1">
+                <a:solidFill>
+                  <a:schemeClr val="tx2">
+                    <a:lumMod val="50000"/>
+                  </a:schemeClr>
+                </a:solidFill>
+              </a:rPr>
+              <a:t>recognised</a:t>
+            </a:r>
+            <a:r>
+              <a:rPr lang="en-US" sz="1000" dirty="0">
+                <a:solidFill>
+                  <a:schemeClr val="tx2">
+                    <a:lumMod val="50000"/>
+                  </a:schemeClr>
+                </a:solidFill>
+              </a:rPr>
+              <a:t>. It will help to identify the logical components.</a:t>
             </a:r>
           </a:p>
         </p:txBody>
@@ -4021,7 +4046,7 @@
                   </a:schemeClr>
                 </a:solidFill>
               </a:rPr>
-              <a:t>Will this program have or need to have the potential potential to scale if the task is  also scaled</a:t>
+              <a:t>Will this program have or need to have the potential potential to scale if the task is also scaled ?</a:t>
             </a:r>
           </a:p>
         </p:txBody>
@@ -4265,7 +4290,7 @@
         </p:nvSpPr>
         <p:spPr>
           <a:xfrm>
-            <a:off x="6975844" y="304423"/>
+            <a:off x="6442444" y="656328"/>
             <a:ext cx="4181397" cy="1450249"/>
           </a:xfrm>
           <a:prstGeom prst="roundRect">
@@ -4307,9 +4332,115 @@
                   <a:srgbClr val="002060"/>
                 </a:solidFill>
               </a:rPr>
-              <a:t>GENERAL OUTLINE PRIOR OPERATION FLOWCHART </a:t>
+              <a:t>GENERAL OUTLINE PRIOR OPERATION FLOWCHART</a:t>
+            </a:r>
+          </a:p>
+          <a:p>
+            <a:pPr algn="r"/>
+            <a:r>
+              <a:rPr lang="en-US" sz="3600" dirty="0">
+                <a:solidFill>
+                  <a:srgbClr val="002060"/>
+                </a:solidFill>
+              </a:rPr>
+              <a:t> </a:t>
             </a:r>
             <a:endParaRPr lang="en-US" sz="3600" dirty="0">
+              <a:solidFill>
+                <a:schemeClr val="tx2">
+                  <a:lumMod val="50000"/>
+                </a:schemeClr>
+              </a:solidFill>
+            </a:endParaRPr>
+          </a:p>
+        </p:txBody>
+      </p:sp>
+      <p:sp>
+        <p:nvSpPr>
+          <p:cNvPr id="16" name="Rounded Rectangle 15">
+            <a:extLst>
+              <a:ext uri="{FF2B5EF4-FFF2-40B4-BE49-F238E27FC236}">
+                <a16:creationId xmlns:a16="http://schemas.microsoft.com/office/drawing/2014/main" id="{8141AE2E-6414-AB44-8B06-1515CEFC6D2A}"/>
+              </a:ext>
+            </a:extLst>
+          </p:cNvPr>
+          <p:cNvSpPr/>
+          <p:nvPr/>
+        </p:nvSpPr>
+        <p:spPr>
+          <a:xfrm>
+            <a:off x="8447314" y="2324065"/>
+            <a:ext cx="2068034" cy="675076"/>
+          </a:xfrm>
+          <a:prstGeom prst="roundRect">
+            <a:avLst/>
+          </a:prstGeom>
+          <a:solidFill>
+            <a:schemeClr val="bg1">
+              <a:alpha val="76184"/>
+            </a:schemeClr>
+          </a:solidFill>
+          <a:ln>
+            <a:noFill/>
+          </a:ln>
+        </p:spPr>
+        <p:style>
+          <a:lnRef idx="2">
+            <a:schemeClr val="accent1">
+              <a:shade val="50000"/>
+            </a:schemeClr>
+          </a:lnRef>
+          <a:fillRef idx="1">
+            <a:schemeClr val="accent1"/>
+          </a:fillRef>
+          <a:effectRef idx="0">
+            <a:schemeClr val="accent1"/>
+          </a:effectRef>
+          <a:fontRef idx="minor">
+            <a:schemeClr val="lt1"/>
+          </a:fontRef>
+        </p:style>
+        <p:txBody>
+          <a:bodyPr rtlCol="0" anchor="ctr"/>
+          <a:lstStyle/>
+          <a:p>
+            <a:pPr algn="r"/>
+            <a:r>
+              <a:rPr lang="en-US" sz="1200" i="1" dirty="0">
+                <a:solidFill>
+                  <a:srgbClr val="002060"/>
+                </a:solidFill>
+              </a:rPr>
+              <a:t>This feature is intended as an additional graphical display of planning, and is NOT the </a:t>
+            </a:r>
+            <a:r>
+              <a:rPr lang="en-US" sz="1200" i="1" dirty="0" err="1">
+                <a:solidFill>
+                  <a:srgbClr val="002060"/>
+                </a:solidFill>
+              </a:rPr>
+              <a:t>standardised</a:t>
+            </a:r>
+            <a:r>
+              <a:rPr lang="en-US" sz="1200" i="1" dirty="0">
+                <a:solidFill>
+                  <a:srgbClr val="002060"/>
+                </a:solidFill>
+              </a:rPr>
+              <a:t> flowchart</a:t>
+            </a:r>
+          </a:p>
+          <a:p>
+            <a:pPr algn="r"/>
+            <a:r>
+              <a:rPr lang="en-US" sz="3600" i="1" dirty="0">
+                <a:solidFill>
+                  <a:srgbClr val="002060"/>
+                </a:solidFill>
+              </a:rPr>
+              <a:t> </a:t>
+            </a:r>
+            <a:endParaRPr lang="en-US" sz="3600" i="1" dirty="0">
               <a:solidFill>
                 <a:schemeClr val="tx2">
                   <a:lumMod val="50000"/>

</xml_diff>